<commit_message>
changed menu for all the rest of themes
</commit_message>
<xml_diff>
--- a/documentation/CogNews_Aug_2015.pptx
+++ b/documentation/CogNews_Aug_2015.pptx
@@ -21,7 +21,22 @@
     <p:sldId id="262" r:id="rId15"/>
     <p:sldId id="263" r:id="rId16"/>
     <p:sldId id="264" r:id="rId17"/>
-    <p:sldId id="272" r:id="rId18"/>
+    <p:sldId id="273" r:id="rId18"/>
+    <p:sldId id="272" r:id="rId19"/>
+    <p:sldId id="274" r:id="rId20"/>
+    <p:sldId id="275" r:id="rId21"/>
+    <p:sldId id="276" r:id="rId22"/>
+    <p:sldId id="277" r:id="rId23"/>
+    <p:sldId id="278" r:id="rId24"/>
+    <p:sldId id="279" r:id="rId25"/>
+    <p:sldId id="280" r:id="rId26"/>
+    <p:sldId id="281" r:id="rId27"/>
+    <p:sldId id="286" r:id="rId28"/>
+    <p:sldId id="285" r:id="rId29"/>
+    <p:sldId id="282" r:id="rId30"/>
+    <p:sldId id="283" r:id="rId31"/>
+    <p:sldId id="284" r:id="rId32"/>
+    <p:sldId id="287" r:id="rId33"/>
   </p:sldIdLst>
   <p:sldSz cx="9144000" cy="6858000" type="screen4x3"/>
   <p:notesSz cx="6858000" cy="9144000"/>
@@ -1514,6 +1529,17 @@
           <a:prstGeom prst="rect">
             <a:avLst/>
           </a:prstGeom>
+          <a:ln w="38100">
+            <a:headEnd type="none" w="med" len="med"/>
+            <a:tailEnd type="arrow" w="med" len="med"/>
+          </a:ln>
+          <a:effectLst>
+            <a:outerShdw blurRad="101600" dist="101600" dir="2700000" algn="tl" rotWithShape="0">
+              <a:prstClr val="black">
+                <a:alpha val="40000"/>
+              </a:prstClr>
+            </a:outerShdw>
+          </a:effectLst>
         </p:spPr>
         <p:style>
           <a:lnRef idx="2">
@@ -1537,7 +1563,11 @@
           <a:p>
             <a:r>
               <a:rPr lang="en-US" dirty="0" smtClean="0"/>
-              <a:t>Colored Labels</a:t>
+              <a:t>Colored </a:t>
+            </a:r>
+            <a:r>
+              <a:rPr lang="en-US" dirty="0" smtClean="0"/>
+              <a:t>Tags</a:t>
             </a:r>
             <a:endParaRPr lang="en-US" dirty="0"/>
           </a:p>
@@ -1563,6 +1593,13 @@
             <a:headEnd type="none" w="med" len="med"/>
             <a:tailEnd type="arrow" w="med" len="med"/>
           </a:ln>
+          <a:effectLst>
+            <a:outerShdw blurRad="101600" dist="101600" dir="2700000" algn="tl" rotWithShape="0">
+              <a:prstClr val="black">
+                <a:alpha val="40000"/>
+              </a:prstClr>
+            </a:outerShdw>
+          </a:effectLst>
         </p:spPr>
         <p:style>
           <a:lnRef idx="2">
@@ -1706,6 +1743,17 @@
           <a:prstGeom prst="rect">
             <a:avLst/>
           </a:prstGeom>
+          <a:ln w="38100">
+            <a:headEnd type="none" w="med" len="med"/>
+            <a:tailEnd type="arrow" w="med" len="med"/>
+          </a:ln>
+          <a:effectLst>
+            <a:outerShdw blurRad="101600" dist="101600" dir="2700000" algn="tl" rotWithShape="0">
+              <a:prstClr val="black">
+                <a:alpha val="40000"/>
+              </a:prstClr>
+            </a:outerShdw>
+          </a:effectLst>
         </p:spPr>
         <p:style>
           <a:lnRef idx="2">
@@ -1753,6 +1801,13 @@
             <a:headEnd type="none" w="med" len="med"/>
             <a:tailEnd type="arrow" w="med" len="med"/>
           </a:ln>
+          <a:effectLst>
+            <a:outerShdw blurRad="101600" dist="101600" dir="2700000" algn="tl" rotWithShape="0">
+              <a:prstClr val="black">
+                <a:alpha val="40000"/>
+              </a:prstClr>
+            </a:outerShdw>
+          </a:effectLst>
         </p:spPr>
         <p:style>
           <a:lnRef idx="2">
@@ -1896,6 +1951,17 @@
           <a:prstGeom prst="rect">
             <a:avLst/>
           </a:prstGeom>
+          <a:ln w="38100">
+            <a:headEnd type="none" w="med" len="med"/>
+            <a:tailEnd type="arrow" w="med" len="med"/>
+          </a:ln>
+          <a:effectLst>
+            <a:outerShdw blurRad="101600" dist="101600" dir="2700000" algn="tl" rotWithShape="0">
+              <a:prstClr val="black">
+                <a:alpha val="40000"/>
+              </a:prstClr>
+            </a:outerShdw>
+          </a:effectLst>
         </p:spPr>
         <p:style>
           <a:lnRef idx="2">
@@ -1943,6 +2009,13 @@
             <a:headEnd type="none" w="med" len="med"/>
             <a:tailEnd type="arrow" w="med" len="med"/>
           </a:ln>
+          <a:effectLst>
+            <a:outerShdw blurRad="101600" dist="101600" dir="2700000" algn="tl" rotWithShape="0">
+              <a:prstClr val="black">
+                <a:alpha val="40000"/>
+              </a:prstClr>
+            </a:outerShdw>
+          </a:effectLst>
         </p:spPr>
         <p:style>
           <a:lnRef idx="2">
@@ -2086,6 +2159,17 @@
           <a:prstGeom prst="rect">
             <a:avLst/>
           </a:prstGeom>
+          <a:ln w="38100">
+            <a:headEnd type="none" w="med" len="med"/>
+            <a:tailEnd type="arrow" w="med" len="med"/>
+          </a:ln>
+          <a:effectLst>
+            <a:outerShdw blurRad="101600" dist="101600" dir="2700000" algn="tl" rotWithShape="0">
+              <a:prstClr val="black">
+                <a:alpha val="40000"/>
+              </a:prstClr>
+            </a:outerShdw>
+          </a:effectLst>
         </p:spPr>
         <p:style>
           <a:lnRef idx="2">
@@ -2105,16 +2189,20 @@
           <a:bodyPr wrap="square" rtlCol="0">
             <a:spAutoFit/>
           </a:bodyPr>
-          <a:lstStyle/>
-          <a:p>
-            <a:r>
-              <a:rPr lang="en-US" dirty="0" smtClean="0"/>
+          <a:lstStyle>
+            <a:defPPr>
+              <a:defRPr lang="en-US"/>
+            </a:defPPr>
+          </a:lstStyle>
+          <a:p>
+            <a:r>
+              <a:rPr lang="en-US" dirty="0"/>
               <a:t>Instant Client-side Filtering,  </a:t>
             </a:r>
           </a:p>
           <a:p>
             <a:r>
-              <a:rPr lang="en-US" dirty="0" smtClean="0"/>
+              <a:rPr lang="en-US" dirty="0"/>
               <a:t>type a few letters and any doc with those characters anywhere in the title or description immediately displayed</a:t>
             </a:r>
             <a:endParaRPr lang="en-US" dirty="0"/>
@@ -2141,6 +2229,13 @@
             <a:headEnd type="none" w="med" len="med"/>
             <a:tailEnd type="arrow" w="med" len="med"/>
           </a:ln>
+          <a:effectLst>
+            <a:outerShdw blurRad="101600" dist="101600" dir="2700000" algn="tl" rotWithShape="0">
+              <a:prstClr val="black">
+                <a:alpha val="40000"/>
+              </a:prstClr>
+            </a:outerShdw>
+          </a:effectLst>
         </p:spPr>
         <p:style>
           <a:lnRef idx="2">
@@ -2284,6 +2379,17 @@
           <a:prstGeom prst="rect">
             <a:avLst/>
           </a:prstGeom>
+          <a:ln w="38100">
+            <a:headEnd type="none" w="med" len="med"/>
+            <a:tailEnd type="arrow" w="med" len="med"/>
+          </a:ln>
+          <a:effectLst>
+            <a:outerShdw blurRad="101600" dist="101600" dir="2700000" algn="tl" rotWithShape="0">
+              <a:prstClr val="black">
+                <a:alpha val="40000"/>
+              </a:prstClr>
+            </a:outerShdw>
+          </a:effectLst>
         </p:spPr>
         <p:style>
           <a:lnRef idx="2">
@@ -2303,10 +2409,14 @@
           <a:bodyPr wrap="square" rtlCol="0">
             <a:spAutoFit/>
           </a:bodyPr>
-          <a:lstStyle/>
-          <a:p>
-            <a:r>
-              <a:rPr lang="en-US" dirty="0" smtClean="0"/>
+          <a:lstStyle>
+            <a:defPPr>
+              <a:defRPr lang="en-US"/>
+            </a:defPPr>
+          </a:lstStyle>
+          <a:p>
+            <a:r>
+              <a:rPr lang="en-US" dirty="0"/>
               <a:t>Instant Filtering,  by tag selects all documents with that tag.</a:t>
             </a:r>
             <a:endParaRPr lang="en-US" dirty="0"/>
@@ -2333,6 +2443,13 @@
             <a:headEnd type="none" w="med" len="med"/>
             <a:tailEnd type="arrow" w="med" len="med"/>
           </a:ln>
+          <a:effectLst>
+            <a:outerShdw blurRad="101600" dist="101600" dir="2700000" algn="tl" rotWithShape="0">
+              <a:prstClr val="black">
+                <a:alpha val="40000"/>
+              </a:prstClr>
+            </a:outerShdw>
+          </a:effectLst>
         </p:spPr>
         <p:style>
           <a:lnRef idx="2">
@@ -2370,6 +2487,113 @@
 </file>
 
 <file path=ppt/slides/slide17.xml><?xml version="1.0" encoding="utf-8"?>
+<p:sld xmlns:a="http://schemas.openxmlformats.org/drawingml/2006/main" xmlns:r="http://schemas.openxmlformats.org/officeDocument/2006/relationships" xmlns:p="http://schemas.openxmlformats.org/presentationml/2006/main">
+  <p:cSld>
+    <p:spTree>
+      <p:nvGrpSpPr>
+        <p:cNvPr id="1" name=""/>
+        <p:cNvGrpSpPr/>
+        <p:nvPr/>
+      </p:nvGrpSpPr>
+      <p:grpSpPr>
+        <a:xfrm>
+          <a:off x="0" y="0"/>
+          <a:ext cx="0" cy="0"/>
+          <a:chOff x="0" y="0"/>
+          <a:chExt cx="0" cy="0"/>
+        </a:xfrm>
+      </p:grpSpPr>
+      <p:sp>
+        <p:nvSpPr>
+          <p:cNvPr id="2" name="Title 1"/>
+          <p:cNvSpPr>
+            <a:spLocks noGrp="1"/>
+          </p:cNvSpPr>
+          <p:nvPr>
+            <p:ph type="title"/>
+          </p:nvPr>
+        </p:nvSpPr>
+        <p:spPr/>
+        <p:txBody>
+          <a:bodyPr/>
+          <a:lstStyle/>
+          <a:p>
+            <a:r>
+              <a:rPr lang="en-US" dirty="0" smtClean="0"/>
+              <a:t>Folder-like Browsing of Tags</a:t>
+            </a:r>
+            <a:endParaRPr lang="en-US" dirty="0"/>
+          </a:p>
+        </p:txBody>
+      </p:sp>
+      <p:pic>
+        <p:nvPicPr>
+          <p:cNvPr id="1026" name="Picture 2"/>
+          <p:cNvPicPr>
+            <a:picLocks noChangeAspect="1" noChangeArrowheads="1"/>
+          </p:cNvPicPr>
+          <p:nvPr/>
+        </p:nvPicPr>
+        <p:blipFill>
+          <a:blip r:embed="rId2">
+            <a:extLst>
+              <a:ext uri="{28A0092B-C50C-407E-A947-70E740481C1C}">
+                <a14:useLocalDpi xmlns:a14="http://schemas.microsoft.com/office/drawing/2010/main" val="0"/>
+              </a:ext>
+            </a:extLst>
+          </a:blip>
+          <a:srcRect/>
+          <a:stretch>
+            <a:fillRect/>
+          </a:stretch>
+        </p:blipFill>
+        <p:spPr bwMode="auto">
+          <a:xfrm>
+            <a:off x="381000" y="2057400"/>
+            <a:ext cx="8359533" cy="4411274"/>
+          </a:xfrm>
+          <a:prstGeom prst="rect">
+            <a:avLst/>
+          </a:prstGeom>
+          <a:noFill/>
+          <a:ln>
+            <a:noFill/>
+          </a:ln>
+          <a:extLst>
+            <a:ext uri="{909E8E84-426E-40DD-AFC4-6F175D3DCCD1}">
+              <a14:hiddenFill xmlns:a14="http://schemas.microsoft.com/office/drawing/2010/main">
+                <a:solidFill>
+                  <a:schemeClr val="accent1"/>
+                </a:solidFill>
+              </a14:hiddenFill>
+            </a:ext>
+            <a:ext uri="{91240B29-F687-4F45-9708-019B960494DF}">
+              <a14:hiddenLine xmlns:a14="http://schemas.microsoft.com/office/drawing/2010/main" w="9525">
+                <a:solidFill>
+                  <a:schemeClr val="tx1"/>
+                </a:solidFill>
+                <a:miter lim="800000"/>
+                <a:headEnd/>
+                <a:tailEnd/>
+              </a14:hiddenLine>
+            </a:ext>
+          </a:extLst>
+        </p:spPr>
+      </p:pic>
+    </p:spTree>
+    <p:extLst>
+      <p:ext uri="{BB962C8B-B14F-4D97-AF65-F5344CB8AC3E}">
+        <p14:creationId xmlns:p14="http://schemas.microsoft.com/office/powerpoint/2010/main" val="4131045471"/>
+      </p:ext>
+    </p:extLst>
+  </p:cSld>
+  <p:clrMapOvr>
+    <a:masterClrMapping/>
+  </p:clrMapOvr>
+</p:sld>
+</file>
+
+<file path=ppt/slides/slide18.xml><?xml version="1.0" encoding="utf-8"?>
 <p:sld xmlns:a="http://schemas.openxmlformats.org/drawingml/2006/main" xmlns:r="http://schemas.openxmlformats.org/officeDocument/2006/relationships" xmlns:p="http://schemas.openxmlformats.org/presentationml/2006/main">
   <p:cSld>
     <p:spTree>
@@ -2476,6 +2700,113 @@
 </p:sld>
 </file>
 
+<file path=ppt/slides/slide19.xml><?xml version="1.0" encoding="utf-8"?>
+<p:sld xmlns:a="http://schemas.openxmlformats.org/drawingml/2006/main" xmlns:r="http://schemas.openxmlformats.org/officeDocument/2006/relationships" xmlns:p="http://schemas.openxmlformats.org/presentationml/2006/main">
+  <p:cSld>
+    <p:spTree>
+      <p:nvGrpSpPr>
+        <p:cNvPr id="1" name=""/>
+        <p:cNvGrpSpPr/>
+        <p:nvPr/>
+      </p:nvGrpSpPr>
+      <p:grpSpPr>
+        <a:xfrm>
+          <a:off x="0" y="0"/>
+          <a:ext cx="0" cy="0"/>
+          <a:chOff x="0" y="0"/>
+          <a:chExt cx="0" cy="0"/>
+        </a:xfrm>
+      </p:grpSpPr>
+      <p:sp>
+        <p:nvSpPr>
+          <p:cNvPr id="2" name="Title 1"/>
+          <p:cNvSpPr>
+            <a:spLocks noGrp="1"/>
+          </p:cNvSpPr>
+          <p:nvPr>
+            <p:ph type="title"/>
+          </p:nvPr>
+        </p:nvSpPr>
+        <p:spPr/>
+        <p:txBody>
+          <a:bodyPr/>
+          <a:lstStyle/>
+          <a:p>
+            <a:r>
+              <a:rPr lang="en-US" dirty="0" smtClean="0"/>
+              <a:t>Drag-and-Drop File Upload</a:t>
+            </a:r>
+            <a:endParaRPr lang="en-US" dirty="0"/>
+          </a:p>
+        </p:txBody>
+      </p:sp>
+      <p:pic>
+        <p:nvPicPr>
+          <p:cNvPr id="2050" name="Picture 2"/>
+          <p:cNvPicPr>
+            <a:picLocks noChangeAspect="1" noChangeArrowheads="1"/>
+          </p:cNvPicPr>
+          <p:nvPr/>
+        </p:nvPicPr>
+        <p:blipFill>
+          <a:blip r:embed="rId2">
+            <a:extLst>
+              <a:ext uri="{28A0092B-C50C-407E-A947-70E740481C1C}">
+                <a14:useLocalDpi xmlns:a14="http://schemas.microsoft.com/office/drawing/2010/main" val="0"/>
+              </a:ext>
+            </a:extLst>
+          </a:blip>
+          <a:srcRect/>
+          <a:stretch>
+            <a:fillRect/>
+          </a:stretch>
+        </p:blipFill>
+        <p:spPr bwMode="auto">
+          <a:xfrm>
+            <a:off x="457200" y="2743200"/>
+            <a:ext cx="8229600" cy="3222126"/>
+          </a:xfrm>
+          <a:prstGeom prst="rect">
+            <a:avLst/>
+          </a:prstGeom>
+          <a:noFill/>
+          <a:ln>
+            <a:noFill/>
+          </a:ln>
+          <a:extLst>
+            <a:ext uri="{909E8E84-426E-40DD-AFC4-6F175D3DCCD1}">
+              <a14:hiddenFill xmlns:a14="http://schemas.microsoft.com/office/drawing/2010/main">
+                <a:solidFill>
+                  <a:schemeClr val="accent1"/>
+                </a:solidFill>
+              </a14:hiddenFill>
+            </a:ext>
+            <a:ext uri="{91240B29-F687-4F45-9708-019B960494DF}">
+              <a14:hiddenLine xmlns:a14="http://schemas.microsoft.com/office/drawing/2010/main" w="9525">
+                <a:solidFill>
+                  <a:schemeClr val="tx1"/>
+                </a:solidFill>
+                <a:miter lim="800000"/>
+                <a:headEnd/>
+                <a:tailEnd/>
+              </a14:hiddenLine>
+            </a:ext>
+          </a:extLst>
+        </p:spPr>
+      </p:pic>
+    </p:spTree>
+    <p:extLst>
+      <p:ext uri="{BB962C8B-B14F-4D97-AF65-F5344CB8AC3E}">
+        <p14:creationId xmlns:p14="http://schemas.microsoft.com/office/powerpoint/2010/main" val="1985191591"/>
+      </p:ext>
+    </p:extLst>
+  </p:cSld>
+  <p:clrMapOvr>
+    <a:masterClrMapping/>
+  </p:clrMapOvr>
+</p:sld>
+</file>
+
 <file path=ppt/slides/slide2.xml><?xml version="1.0" encoding="utf-8"?>
 <p:sld xmlns:a="http://schemas.openxmlformats.org/drawingml/2006/main" xmlns:r="http://schemas.openxmlformats.org/officeDocument/2006/relationships" xmlns:p="http://schemas.openxmlformats.org/presentationml/2006/main">
   <p:cSld>
@@ -2581,6 +2912,1659 @@
     <p:extLst>
       <p:ext uri="{BB962C8B-B14F-4D97-AF65-F5344CB8AC3E}">
         <p14:creationId xmlns:p14="http://schemas.microsoft.com/office/powerpoint/2010/main" val="93946333"/>
+      </p:ext>
+    </p:extLst>
+  </p:cSld>
+  <p:clrMapOvr>
+    <a:masterClrMapping/>
+  </p:clrMapOvr>
+</p:sld>
+</file>
+
+<file path=ppt/slides/slide20.xml><?xml version="1.0" encoding="utf-8"?>
+<p:sld xmlns:a="http://schemas.openxmlformats.org/drawingml/2006/main" xmlns:r="http://schemas.openxmlformats.org/officeDocument/2006/relationships" xmlns:p="http://schemas.openxmlformats.org/presentationml/2006/main">
+  <p:cSld>
+    <p:spTree>
+      <p:nvGrpSpPr>
+        <p:cNvPr id="1" name=""/>
+        <p:cNvGrpSpPr/>
+        <p:nvPr/>
+      </p:nvGrpSpPr>
+      <p:grpSpPr>
+        <a:xfrm>
+          <a:off x="0" y="0"/>
+          <a:ext cx="0" cy="0"/>
+          <a:chOff x="0" y="0"/>
+          <a:chExt cx="0" cy="0"/>
+        </a:xfrm>
+      </p:grpSpPr>
+      <p:sp>
+        <p:nvSpPr>
+          <p:cNvPr id="2" name="Title 1"/>
+          <p:cNvSpPr>
+            <a:spLocks noGrp="1"/>
+          </p:cNvSpPr>
+          <p:nvPr>
+            <p:ph type="title"/>
+          </p:nvPr>
+        </p:nvSpPr>
+        <p:spPr/>
+        <p:txBody>
+          <a:bodyPr/>
+          <a:lstStyle/>
+          <a:p>
+            <a:r>
+              <a:rPr lang="en-US" dirty="0" smtClean="0"/>
+              <a:t>Multiple Files, Settings</a:t>
+            </a:r>
+            <a:endParaRPr lang="en-US" dirty="0"/>
+          </a:p>
+        </p:txBody>
+      </p:sp>
+      <p:pic>
+        <p:nvPicPr>
+          <p:cNvPr id="3074" name="Picture 2"/>
+          <p:cNvPicPr>
+            <a:picLocks noChangeAspect="1" noChangeArrowheads="1"/>
+          </p:cNvPicPr>
+          <p:nvPr/>
+        </p:nvPicPr>
+        <p:blipFill>
+          <a:blip r:embed="rId2">
+            <a:extLst>
+              <a:ext uri="{28A0092B-C50C-407E-A947-70E740481C1C}">
+                <a14:useLocalDpi xmlns:a14="http://schemas.microsoft.com/office/drawing/2010/main" val="0"/>
+              </a:ext>
+            </a:extLst>
+          </a:blip>
+          <a:srcRect/>
+          <a:stretch>
+            <a:fillRect/>
+          </a:stretch>
+        </p:blipFill>
+        <p:spPr bwMode="auto">
+          <a:xfrm>
+            <a:off x="914400" y="1447800"/>
+            <a:ext cx="7239000" cy="5095485"/>
+          </a:xfrm>
+          <a:prstGeom prst="rect">
+            <a:avLst/>
+          </a:prstGeom>
+          <a:noFill/>
+          <a:ln>
+            <a:noFill/>
+          </a:ln>
+          <a:extLst>
+            <a:ext uri="{909E8E84-426E-40DD-AFC4-6F175D3DCCD1}">
+              <a14:hiddenFill xmlns:a14="http://schemas.microsoft.com/office/drawing/2010/main">
+                <a:solidFill>
+                  <a:schemeClr val="accent1"/>
+                </a:solidFill>
+              </a14:hiddenFill>
+            </a:ext>
+            <a:ext uri="{91240B29-F687-4F45-9708-019B960494DF}">
+              <a14:hiddenLine xmlns:a14="http://schemas.microsoft.com/office/drawing/2010/main" w="9525">
+                <a:solidFill>
+                  <a:schemeClr val="tx1"/>
+                </a:solidFill>
+                <a:miter lim="800000"/>
+                <a:headEnd/>
+                <a:tailEnd/>
+              </a14:hiddenLine>
+            </a:ext>
+          </a:extLst>
+        </p:spPr>
+      </p:pic>
+    </p:spTree>
+    <p:extLst>
+      <p:ext uri="{BB962C8B-B14F-4D97-AF65-F5344CB8AC3E}">
+        <p14:creationId xmlns:p14="http://schemas.microsoft.com/office/powerpoint/2010/main" val="707766054"/>
+      </p:ext>
+    </p:extLst>
+  </p:cSld>
+  <p:clrMapOvr>
+    <a:masterClrMapping/>
+  </p:clrMapOvr>
+</p:sld>
+</file>
+
+<file path=ppt/slides/slide21.xml><?xml version="1.0" encoding="utf-8"?>
+<p:sld xmlns:a="http://schemas.openxmlformats.org/drawingml/2006/main" xmlns:r="http://schemas.openxmlformats.org/officeDocument/2006/relationships" xmlns:p="http://schemas.openxmlformats.org/presentationml/2006/main">
+  <p:cSld>
+    <p:spTree>
+      <p:nvGrpSpPr>
+        <p:cNvPr id="1" name=""/>
+        <p:cNvGrpSpPr/>
+        <p:nvPr/>
+      </p:nvGrpSpPr>
+      <p:grpSpPr>
+        <a:xfrm>
+          <a:off x="0" y="0"/>
+          <a:ext cx="0" cy="0"/>
+          <a:chOff x="0" y="0"/>
+          <a:chExt cx="0" cy="0"/>
+        </a:xfrm>
+      </p:grpSpPr>
+      <p:sp>
+        <p:nvSpPr>
+          <p:cNvPr id="2" name="Title 1"/>
+          <p:cNvSpPr>
+            <a:spLocks noGrp="1"/>
+          </p:cNvSpPr>
+          <p:nvPr>
+            <p:ph type="title"/>
+          </p:nvPr>
+        </p:nvSpPr>
+        <p:spPr/>
+        <p:txBody>
+          <a:bodyPr/>
+          <a:lstStyle/>
+          <a:p>
+            <a:r>
+              <a:rPr lang="en-US" dirty="0" smtClean="0"/>
+              <a:t>Upload Completed</a:t>
+            </a:r>
+            <a:endParaRPr lang="en-US" dirty="0"/>
+          </a:p>
+        </p:txBody>
+      </p:sp>
+      <p:pic>
+        <p:nvPicPr>
+          <p:cNvPr id="4098" name="Picture 2"/>
+          <p:cNvPicPr>
+            <a:picLocks noChangeAspect="1" noChangeArrowheads="1"/>
+          </p:cNvPicPr>
+          <p:nvPr/>
+        </p:nvPicPr>
+        <p:blipFill>
+          <a:blip r:embed="rId2">
+            <a:extLst>
+              <a:ext uri="{28A0092B-C50C-407E-A947-70E740481C1C}">
+                <a14:useLocalDpi xmlns:a14="http://schemas.microsoft.com/office/drawing/2010/main" val="0"/>
+              </a:ext>
+            </a:extLst>
+          </a:blip>
+          <a:srcRect/>
+          <a:stretch>
+            <a:fillRect/>
+          </a:stretch>
+        </p:blipFill>
+        <p:spPr bwMode="auto">
+          <a:xfrm>
+            <a:off x="381000" y="1752600"/>
+            <a:ext cx="8469346" cy="4820092"/>
+          </a:xfrm>
+          <a:prstGeom prst="rect">
+            <a:avLst/>
+          </a:prstGeom>
+          <a:noFill/>
+          <a:ln>
+            <a:noFill/>
+          </a:ln>
+          <a:extLst>
+            <a:ext uri="{909E8E84-426E-40DD-AFC4-6F175D3DCCD1}">
+              <a14:hiddenFill xmlns:a14="http://schemas.microsoft.com/office/drawing/2010/main">
+                <a:solidFill>
+                  <a:schemeClr val="accent1"/>
+                </a:solidFill>
+              </a14:hiddenFill>
+            </a:ext>
+            <a:ext uri="{91240B29-F687-4F45-9708-019B960494DF}">
+              <a14:hiddenLine xmlns:a14="http://schemas.microsoft.com/office/drawing/2010/main" w="9525">
+                <a:solidFill>
+                  <a:schemeClr val="tx1"/>
+                </a:solidFill>
+                <a:miter lim="800000"/>
+                <a:headEnd/>
+                <a:tailEnd/>
+              </a14:hiddenLine>
+            </a:ext>
+          </a:extLst>
+        </p:spPr>
+      </p:pic>
+    </p:spTree>
+    <p:extLst>
+      <p:ext uri="{BB962C8B-B14F-4D97-AF65-F5344CB8AC3E}">
+        <p14:creationId xmlns:p14="http://schemas.microsoft.com/office/powerpoint/2010/main" val="2613690651"/>
+      </p:ext>
+    </p:extLst>
+  </p:cSld>
+  <p:clrMapOvr>
+    <a:masterClrMapping/>
+  </p:clrMapOvr>
+</p:sld>
+</file>
+
+<file path=ppt/slides/slide22.xml><?xml version="1.0" encoding="utf-8"?>
+<p:sld xmlns:a="http://schemas.openxmlformats.org/drawingml/2006/main" xmlns:r="http://schemas.openxmlformats.org/officeDocument/2006/relationships" xmlns:p="http://schemas.openxmlformats.org/presentationml/2006/main">
+  <p:cSld>
+    <p:spTree>
+      <p:nvGrpSpPr>
+        <p:cNvPr id="1" name=""/>
+        <p:cNvGrpSpPr/>
+        <p:nvPr/>
+      </p:nvGrpSpPr>
+      <p:grpSpPr>
+        <a:xfrm>
+          <a:off x="0" y="0"/>
+          <a:ext cx="0" cy="0"/>
+          <a:chOff x="0" y="0"/>
+          <a:chExt cx="0" cy="0"/>
+        </a:xfrm>
+      </p:grpSpPr>
+      <p:sp>
+        <p:nvSpPr>
+          <p:cNvPr id="2" name="Title 1"/>
+          <p:cNvSpPr>
+            <a:spLocks noGrp="1"/>
+          </p:cNvSpPr>
+          <p:nvPr>
+            <p:ph type="title"/>
+          </p:nvPr>
+        </p:nvSpPr>
+        <p:spPr/>
+        <p:txBody>
+          <a:bodyPr/>
+          <a:lstStyle/>
+          <a:p>
+            <a:r>
+              <a:rPr lang="en-US" dirty="0" smtClean="0"/>
+              <a:t>Updated Action Item List</a:t>
+            </a:r>
+            <a:endParaRPr lang="en-US" dirty="0"/>
+          </a:p>
+        </p:txBody>
+      </p:sp>
+      <p:pic>
+        <p:nvPicPr>
+          <p:cNvPr id="5122" name="Picture 2"/>
+          <p:cNvPicPr>
+            <a:picLocks noChangeAspect="1" noChangeArrowheads="1"/>
+          </p:cNvPicPr>
+          <p:nvPr/>
+        </p:nvPicPr>
+        <p:blipFill>
+          <a:blip r:embed="rId2">
+            <a:extLst>
+              <a:ext uri="{28A0092B-C50C-407E-A947-70E740481C1C}">
+                <a14:useLocalDpi xmlns:a14="http://schemas.microsoft.com/office/drawing/2010/main" val="0"/>
+              </a:ext>
+            </a:extLst>
+          </a:blip>
+          <a:srcRect/>
+          <a:stretch>
+            <a:fillRect/>
+          </a:stretch>
+        </p:blipFill>
+        <p:spPr bwMode="auto">
+          <a:xfrm>
+            <a:off x="304799" y="1676400"/>
+            <a:ext cx="8708547" cy="4926498"/>
+          </a:xfrm>
+          <a:prstGeom prst="rect">
+            <a:avLst/>
+          </a:prstGeom>
+          <a:noFill/>
+          <a:ln>
+            <a:noFill/>
+          </a:ln>
+          <a:extLst>
+            <a:ext uri="{909E8E84-426E-40DD-AFC4-6F175D3DCCD1}">
+              <a14:hiddenFill xmlns:a14="http://schemas.microsoft.com/office/drawing/2010/main">
+                <a:solidFill>
+                  <a:schemeClr val="accent1"/>
+                </a:solidFill>
+              </a14:hiddenFill>
+            </a:ext>
+            <a:ext uri="{91240B29-F687-4F45-9708-019B960494DF}">
+              <a14:hiddenLine xmlns:a14="http://schemas.microsoft.com/office/drawing/2010/main" w="9525">
+                <a:solidFill>
+                  <a:schemeClr val="tx1"/>
+                </a:solidFill>
+                <a:miter lim="800000"/>
+                <a:headEnd/>
+                <a:tailEnd/>
+              </a14:hiddenLine>
+            </a:ext>
+          </a:extLst>
+        </p:spPr>
+      </p:pic>
+      <p:sp>
+        <p:nvSpPr>
+          <p:cNvPr id="4" name="TextBox 3"/>
+          <p:cNvSpPr txBox="1"/>
+          <p:nvPr/>
+        </p:nvSpPr>
+        <p:spPr>
+          <a:xfrm>
+            <a:off x="627399" y="1108364"/>
+            <a:ext cx="3030201" cy="369332"/>
+          </a:xfrm>
+          <a:prstGeom prst="rect">
+            <a:avLst/>
+          </a:prstGeom>
+          <a:effectLst>
+            <a:outerShdw blurRad="50800" dist="101600" dir="2700000" algn="tl" rotWithShape="0">
+              <a:prstClr val="black">
+                <a:alpha val="40000"/>
+              </a:prstClr>
+            </a:outerShdw>
+          </a:effectLst>
+        </p:spPr>
+        <p:style>
+          <a:lnRef idx="2">
+            <a:schemeClr val="accent3"/>
+          </a:lnRef>
+          <a:fillRef idx="1">
+            <a:schemeClr val="lt1"/>
+          </a:fillRef>
+          <a:effectRef idx="0">
+            <a:schemeClr val="accent3"/>
+          </a:effectRef>
+          <a:fontRef idx="minor">
+            <a:schemeClr val="dk1"/>
+          </a:fontRef>
+        </p:style>
+        <p:txBody>
+          <a:bodyPr wrap="square" rtlCol="0">
+            <a:spAutoFit/>
+          </a:bodyPr>
+          <a:lstStyle/>
+          <a:p>
+            <a:r>
+              <a:rPr lang="en-US" dirty="0" smtClean="0"/>
+              <a:t>Instant Client-side </a:t>
+            </a:r>
+            <a:r>
+              <a:rPr lang="en-US" dirty="0" smtClean="0"/>
+              <a:t>Filtering</a:t>
+            </a:r>
+            <a:endParaRPr lang="en-US" dirty="0" smtClean="0"/>
+          </a:p>
+        </p:txBody>
+      </p:sp>
+      <p:cxnSp>
+        <p:nvCxnSpPr>
+          <p:cNvPr id="5" name="Straight Arrow Connector 4"/>
+          <p:cNvCxnSpPr>
+            <a:stCxn id="4" idx="2"/>
+          </p:cNvCxnSpPr>
+          <p:nvPr/>
+        </p:nvCxnSpPr>
+        <p:spPr>
+          <a:xfrm flipH="1">
+            <a:off x="1676402" y="1477696"/>
+            <a:ext cx="466098" cy="1900443"/>
+          </a:xfrm>
+          <a:prstGeom prst="straightConnector1">
+            <a:avLst/>
+          </a:prstGeom>
+          <a:ln w="38100">
+            <a:headEnd type="none" w="med" len="med"/>
+            <a:tailEnd type="arrow" w="med" len="med"/>
+          </a:ln>
+          <a:effectLst>
+            <a:outerShdw blurRad="101600" dist="101600" dir="2700000" algn="tl" rotWithShape="0">
+              <a:prstClr val="black">
+                <a:alpha val="40000"/>
+              </a:prstClr>
+            </a:outerShdw>
+          </a:effectLst>
+        </p:spPr>
+        <p:style>
+          <a:lnRef idx="2">
+            <a:schemeClr val="accent3"/>
+          </a:lnRef>
+          <a:fillRef idx="1">
+            <a:schemeClr val="lt1"/>
+          </a:fillRef>
+          <a:effectRef idx="0">
+            <a:schemeClr val="accent3"/>
+          </a:effectRef>
+          <a:fontRef idx="minor">
+            <a:schemeClr val="dk1"/>
+          </a:fontRef>
+        </p:style>
+      </p:cxnSp>
+    </p:spTree>
+    <p:extLst>
+      <p:ext uri="{BB962C8B-B14F-4D97-AF65-F5344CB8AC3E}">
+        <p14:creationId xmlns:p14="http://schemas.microsoft.com/office/powerpoint/2010/main" val="216005926"/>
+      </p:ext>
+    </p:extLst>
+  </p:cSld>
+  <p:clrMapOvr>
+    <a:masterClrMapping/>
+  </p:clrMapOvr>
+</p:sld>
+</file>
+
+<file path=ppt/slides/slide23.xml><?xml version="1.0" encoding="utf-8"?>
+<p:sld xmlns:a="http://schemas.openxmlformats.org/drawingml/2006/main" xmlns:r="http://schemas.openxmlformats.org/officeDocument/2006/relationships" xmlns:p="http://schemas.openxmlformats.org/presentationml/2006/main">
+  <p:cSld>
+    <p:spTree>
+      <p:nvGrpSpPr>
+        <p:cNvPr id="1" name=""/>
+        <p:cNvGrpSpPr/>
+        <p:nvPr/>
+      </p:nvGrpSpPr>
+      <p:grpSpPr>
+        <a:xfrm>
+          <a:off x="0" y="0"/>
+          <a:ext cx="0" cy="0"/>
+          <a:chOff x="0" y="0"/>
+          <a:chExt cx="0" cy="0"/>
+        </a:xfrm>
+      </p:grpSpPr>
+      <p:sp>
+        <p:nvSpPr>
+          <p:cNvPr id="2" name="Title 1"/>
+          <p:cNvSpPr>
+            <a:spLocks noGrp="1"/>
+          </p:cNvSpPr>
+          <p:nvPr>
+            <p:ph type="title"/>
+          </p:nvPr>
+        </p:nvSpPr>
+        <p:spPr/>
+        <p:txBody>
+          <a:bodyPr/>
+          <a:lstStyle/>
+          <a:p>
+            <a:r>
+              <a:rPr lang="en-US" dirty="0" smtClean="0"/>
+              <a:t>Simplified, Clean UI</a:t>
+            </a:r>
+            <a:endParaRPr lang="en-US" dirty="0"/>
+          </a:p>
+        </p:txBody>
+      </p:sp>
+      <p:pic>
+        <p:nvPicPr>
+          <p:cNvPr id="6146" name="Picture 2"/>
+          <p:cNvPicPr>
+            <a:picLocks noChangeAspect="1" noChangeArrowheads="1"/>
+          </p:cNvPicPr>
+          <p:nvPr/>
+        </p:nvPicPr>
+        <p:blipFill>
+          <a:blip r:embed="rId2">
+            <a:extLst>
+              <a:ext uri="{28A0092B-C50C-407E-A947-70E740481C1C}">
+                <a14:useLocalDpi xmlns:a14="http://schemas.microsoft.com/office/drawing/2010/main" val="0"/>
+              </a:ext>
+            </a:extLst>
+          </a:blip>
+          <a:srcRect/>
+          <a:stretch>
+            <a:fillRect/>
+          </a:stretch>
+        </p:blipFill>
+        <p:spPr bwMode="auto">
+          <a:xfrm>
+            <a:off x="609600" y="1752600"/>
+            <a:ext cx="7877175" cy="4836442"/>
+          </a:xfrm>
+          <a:prstGeom prst="rect">
+            <a:avLst/>
+          </a:prstGeom>
+          <a:noFill/>
+          <a:ln>
+            <a:noFill/>
+          </a:ln>
+          <a:extLst>
+            <a:ext uri="{909E8E84-426E-40DD-AFC4-6F175D3DCCD1}">
+              <a14:hiddenFill xmlns:a14="http://schemas.microsoft.com/office/drawing/2010/main">
+                <a:solidFill>
+                  <a:schemeClr val="accent1"/>
+                </a:solidFill>
+              </a14:hiddenFill>
+            </a:ext>
+            <a:ext uri="{91240B29-F687-4F45-9708-019B960494DF}">
+              <a14:hiddenLine xmlns:a14="http://schemas.microsoft.com/office/drawing/2010/main" w="9525">
+                <a:solidFill>
+                  <a:schemeClr val="tx1"/>
+                </a:solidFill>
+                <a:miter lim="800000"/>
+                <a:headEnd/>
+                <a:tailEnd/>
+              </a14:hiddenLine>
+            </a:ext>
+          </a:extLst>
+        </p:spPr>
+      </p:pic>
+    </p:spTree>
+    <p:extLst>
+      <p:ext uri="{BB962C8B-B14F-4D97-AF65-F5344CB8AC3E}">
+        <p14:creationId xmlns:p14="http://schemas.microsoft.com/office/powerpoint/2010/main" val="1466615624"/>
+      </p:ext>
+    </p:extLst>
+  </p:cSld>
+  <p:clrMapOvr>
+    <a:masterClrMapping/>
+  </p:clrMapOvr>
+</p:sld>
+</file>
+
+<file path=ppt/slides/slide24.xml><?xml version="1.0" encoding="utf-8"?>
+<p:sld xmlns:a="http://schemas.openxmlformats.org/drawingml/2006/main" xmlns:r="http://schemas.openxmlformats.org/officeDocument/2006/relationships" xmlns:p="http://schemas.openxmlformats.org/presentationml/2006/main">
+  <p:cSld>
+    <p:spTree>
+      <p:nvGrpSpPr>
+        <p:cNvPr id="1" name=""/>
+        <p:cNvGrpSpPr/>
+        <p:nvPr/>
+      </p:nvGrpSpPr>
+      <p:grpSpPr>
+        <a:xfrm>
+          <a:off x="0" y="0"/>
+          <a:ext cx="0" cy="0"/>
+          <a:chOff x="0" y="0"/>
+          <a:chExt cx="0" cy="0"/>
+        </a:xfrm>
+      </p:grpSpPr>
+      <p:sp>
+        <p:nvSpPr>
+          <p:cNvPr id="2" name="Title 1"/>
+          <p:cNvSpPr>
+            <a:spLocks noGrp="1"/>
+          </p:cNvSpPr>
+          <p:nvPr>
+            <p:ph type="title"/>
+          </p:nvPr>
+        </p:nvSpPr>
+        <p:spPr/>
+        <p:txBody>
+          <a:bodyPr/>
+          <a:lstStyle/>
+          <a:p>
+            <a:endParaRPr lang="en-US"/>
+          </a:p>
+        </p:txBody>
+      </p:sp>
+      <p:pic>
+        <p:nvPicPr>
+          <p:cNvPr id="7170" name="Picture 2"/>
+          <p:cNvPicPr>
+            <a:picLocks noChangeAspect="1" noChangeArrowheads="1"/>
+          </p:cNvPicPr>
+          <p:nvPr/>
+        </p:nvPicPr>
+        <p:blipFill>
+          <a:blip r:embed="rId2">
+            <a:extLst>
+              <a:ext uri="{28A0092B-C50C-407E-A947-70E740481C1C}">
+                <a14:useLocalDpi xmlns:a14="http://schemas.microsoft.com/office/drawing/2010/main" val="0"/>
+              </a:ext>
+            </a:extLst>
+          </a:blip>
+          <a:srcRect/>
+          <a:stretch>
+            <a:fillRect/>
+          </a:stretch>
+        </p:blipFill>
+        <p:spPr bwMode="auto">
+          <a:xfrm>
+            <a:off x="609600" y="1905000"/>
+            <a:ext cx="7905750" cy="4395661"/>
+          </a:xfrm>
+          <a:prstGeom prst="rect">
+            <a:avLst/>
+          </a:prstGeom>
+          <a:noFill/>
+          <a:ln>
+            <a:noFill/>
+          </a:ln>
+          <a:extLst>
+            <a:ext uri="{909E8E84-426E-40DD-AFC4-6F175D3DCCD1}">
+              <a14:hiddenFill xmlns:a14="http://schemas.microsoft.com/office/drawing/2010/main">
+                <a:solidFill>
+                  <a:schemeClr val="accent1"/>
+                </a:solidFill>
+              </a14:hiddenFill>
+            </a:ext>
+            <a:ext uri="{91240B29-F687-4F45-9708-019B960494DF}">
+              <a14:hiddenLine xmlns:a14="http://schemas.microsoft.com/office/drawing/2010/main" w="9525">
+                <a:solidFill>
+                  <a:schemeClr val="tx1"/>
+                </a:solidFill>
+                <a:miter lim="800000"/>
+                <a:headEnd/>
+                <a:tailEnd/>
+              </a14:hiddenLine>
+            </a:ext>
+          </a:extLst>
+        </p:spPr>
+      </p:pic>
+    </p:spTree>
+    <p:extLst>
+      <p:ext uri="{BB962C8B-B14F-4D97-AF65-F5344CB8AC3E}">
+        <p14:creationId xmlns:p14="http://schemas.microsoft.com/office/powerpoint/2010/main" val="2389381981"/>
+      </p:ext>
+    </p:extLst>
+  </p:cSld>
+  <p:clrMapOvr>
+    <a:masterClrMapping/>
+  </p:clrMapOvr>
+</p:sld>
+</file>
+
+<file path=ppt/slides/slide25.xml><?xml version="1.0" encoding="utf-8"?>
+<p:sld xmlns:a="http://schemas.openxmlformats.org/drawingml/2006/main" xmlns:r="http://schemas.openxmlformats.org/officeDocument/2006/relationships" xmlns:p="http://schemas.openxmlformats.org/presentationml/2006/main">
+  <p:cSld>
+    <p:spTree>
+      <p:nvGrpSpPr>
+        <p:cNvPr id="1" name=""/>
+        <p:cNvGrpSpPr/>
+        <p:nvPr/>
+      </p:nvGrpSpPr>
+      <p:grpSpPr>
+        <a:xfrm>
+          <a:off x="0" y="0"/>
+          <a:ext cx="0" cy="0"/>
+          <a:chOff x="0" y="0"/>
+          <a:chExt cx="0" cy="0"/>
+        </a:xfrm>
+      </p:grpSpPr>
+      <p:sp>
+        <p:nvSpPr>
+          <p:cNvPr id="2" name="Title 1"/>
+          <p:cNvSpPr>
+            <a:spLocks noGrp="1"/>
+          </p:cNvSpPr>
+          <p:nvPr>
+            <p:ph type="title"/>
+          </p:nvPr>
+        </p:nvSpPr>
+        <p:spPr/>
+        <p:txBody>
+          <a:bodyPr/>
+          <a:lstStyle/>
+          <a:p>
+            <a:r>
+              <a:rPr lang="en-US" dirty="0" smtClean="0"/>
+              <a:t>Notes are now “Topics”</a:t>
+            </a:r>
+            <a:endParaRPr lang="en-US" dirty="0"/>
+          </a:p>
+        </p:txBody>
+      </p:sp>
+      <p:pic>
+        <p:nvPicPr>
+          <p:cNvPr id="8194" name="Picture 2"/>
+          <p:cNvPicPr>
+            <a:picLocks noChangeAspect="1" noChangeArrowheads="1"/>
+          </p:cNvPicPr>
+          <p:nvPr/>
+        </p:nvPicPr>
+        <p:blipFill>
+          <a:blip r:embed="rId2">
+            <a:extLst>
+              <a:ext uri="{28A0092B-C50C-407E-A947-70E740481C1C}">
+                <a14:useLocalDpi xmlns:a14="http://schemas.microsoft.com/office/drawing/2010/main" val="0"/>
+              </a:ext>
+            </a:extLst>
+          </a:blip>
+          <a:srcRect/>
+          <a:stretch>
+            <a:fillRect/>
+          </a:stretch>
+        </p:blipFill>
+        <p:spPr bwMode="auto">
+          <a:xfrm>
+            <a:off x="381000" y="2133600"/>
+            <a:ext cx="8562975" cy="3984580"/>
+          </a:xfrm>
+          <a:prstGeom prst="rect">
+            <a:avLst/>
+          </a:prstGeom>
+          <a:noFill/>
+          <a:ln>
+            <a:noFill/>
+          </a:ln>
+          <a:extLst>
+            <a:ext uri="{909E8E84-426E-40DD-AFC4-6F175D3DCCD1}">
+              <a14:hiddenFill xmlns:a14="http://schemas.microsoft.com/office/drawing/2010/main">
+                <a:solidFill>
+                  <a:schemeClr val="accent1"/>
+                </a:solidFill>
+              </a14:hiddenFill>
+            </a:ext>
+            <a:ext uri="{91240B29-F687-4F45-9708-019B960494DF}">
+              <a14:hiddenLine xmlns:a14="http://schemas.microsoft.com/office/drawing/2010/main" w="9525">
+                <a:solidFill>
+                  <a:schemeClr val="tx1"/>
+                </a:solidFill>
+                <a:miter lim="800000"/>
+                <a:headEnd/>
+                <a:tailEnd/>
+              </a14:hiddenLine>
+            </a:ext>
+          </a:extLst>
+        </p:spPr>
+      </p:pic>
+    </p:spTree>
+    <p:extLst>
+      <p:ext uri="{BB962C8B-B14F-4D97-AF65-F5344CB8AC3E}">
+        <p14:creationId xmlns:p14="http://schemas.microsoft.com/office/powerpoint/2010/main" val="2658451796"/>
+      </p:ext>
+    </p:extLst>
+  </p:cSld>
+  <p:clrMapOvr>
+    <a:masterClrMapping/>
+  </p:clrMapOvr>
+</p:sld>
+</file>
+
+<file path=ppt/slides/slide26.xml><?xml version="1.0" encoding="utf-8"?>
+<p:sld xmlns:a="http://schemas.openxmlformats.org/drawingml/2006/main" xmlns:r="http://schemas.openxmlformats.org/officeDocument/2006/relationships" xmlns:p="http://schemas.openxmlformats.org/presentationml/2006/main">
+  <p:cSld>
+    <p:spTree>
+      <p:nvGrpSpPr>
+        <p:cNvPr id="1" name=""/>
+        <p:cNvGrpSpPr/>
+        <p:nvPr/>
+      </p:nvGrpSpPr>
+      <p:grpSpPr>
+        <a:xfrm>
+          <a:off x="0" y="0"/>
+          <a:ext cx="0" cy="0"/>
+          <a:chOff x="0" y="0"/>
+          <a:chExt cx="0" cy="0"/>
+        </a:xfrm>
+      </p:grpSpPr>
+      <p:sp>
+        <p:nvSpPr>
+          <p:cNvPr id="2" name="Title 1"/>
+          <p:cNvSpPr>
+            <a:spLocks noGrp="1"/>
+          </p:cNvSpPr>
+          <p:nvPr>
+            <p:ph type="title"/>
+          </p:nvPr>
+        </p:nvSpPr>
+        <p:spPr/>
+        <p:txBody>
+          <a:bodyPr/>
+          <a:lstStyle/>
+          <a:p>
+            <a:endParaRPr lang="en-US" dirty="0"/>
+          </a:p>
+        </p:txBody>
+      </p:sp>
+      <p:pic>
+        <p:nvPicPr>
+          <p:cNvPr id="9218" name="Picture 2"/>
+          <p:cNvPicPr>
+            <a:picLocks noChangeAspect="1" noChangeArrowheads="1"/>
+          </p:cNvPicPr>
+          <p:nvPr/>
+        </p:nvPicPr>
+        <p:blipFill>
+          <a:blip r:embed="rId2">
+            <a:extLst>
+              <a:ext uri="{28A0092B-C50C-407E-A947-70E740481C1C}">
+                <a14:useLocalDpi xmlns:a14="http://schemas.microsoft.com/office/drawing/2010/main" val="0"/>
+              </a:ext>
+            </a:extLst>
+          </a:blip>
+          <a:srcRect/>
+          <a:stretch>
+            <a:fillRect/>
+          </a:stretch>
+        </p:blipFill>
+        <p:spPr bwMode="auto">
+          <a:xfrm>
+            <a:off x="360218" y="2514600"/>
+            <a:ext cx="8522626" cy="3838174"/>
+          </a:xfrm>
+          <a:prstGeom prst="rect">
+            <a:avLst/>
+          </a:prstGeom>
+          <a:noFill/>
+          <a:ln>
+            <a:noFill/>
+          </a:ln>
+          <a:extLst>
+            <a:ext uri="{909E8E84-426E-40DD-AFC4-6F175D3DCCD1}">
+              <a14:hiddenFill xmlns:a14="http://schemas.microsoft.com/office/drawing/2010/main">
+                <a:solidFill>
+                  <a:schemeClr val="accent1"/>
+                </a:solidFill>
+              </a14:hiddenFill>
+            </a:ext>
+            <a:ext uri="{91240B29-F687-4F45-9708-019B960494DF}">
+              <a14:hiddenLine xmlns:a14="http://schemas.microsoft.com/office/drawing/2010/main" w="9525">
+                <a:solidFill>
+                  <a:schemeClr val="tx1"/>
+                </a:solidFill>
+                <a:miter lim="800000"/>
+                <a:headEnd/>
+                <a:tailEnd/>
+              </a14:hiddenLine>
+            </a:ext>
+          </a:extLst>
+        </p:spPr>
+      </p:pic>
+      <p:sp>
+        <p:nvSpPr>
+          <p:cNvPr id="4" name="TextBox 3"/>
+          <p:cNvSpPr txBox="1"/>
+          <p:nvPr/>
+        </p:nvSpPr>
+        <p:spPr>
+          <a:xfrm>
+            <a:off x="627397" y="1353234"/>
+            <a:ext cx="3030201" cy="646331"/>
+          </a:xfrm>
+          <a:prstGeom prst="rect">
+            <a:avLst/>
+          </a:prstGeom>
+          <a:effectLst>
+            <a:outerShdw blurRad="50800" dist="101600" dir="2700000" algn="tl" rotWithShape="0">
+              <a:prstClr val="black">
+                <a:alpha val="40000"/>
+              </a:prstClr>
+            </a:outerShdw>
+          </a:effectLst>
+        </p:spPr>
+        <p:style>
+          <a:lnRef idx="2">
+            <a:schemeClr val="accent3"/>
+          </a:lnRef>
+          <a:fillRef idx="1">
+            <a:schemeClr val="lt1"/>
+          </a:fillRef>
+          <a:effectRef idx="0">
+            <a:schemeClr val="accent3"/>
+          </a:effectRef>
+          <a:fontRef idx="minor">
+            <a:schemeClr val="dk1"/>
+          </a:fontRef>
+        </p:style>
+        <p:txBody>
+          <a:bodyPr wrap="square" rtlCol="0">
+            <a:spAutoFit/>
+          </a:bodyPr>
+          <a:lstStyle/>
+          <a:p>
+            <a:r>
+              <a:rPr lang="en-US" dirty="0" smtClean="0"/>
+              <a:t>Instant Client-side </a:t>
+            </a:r>
+            <a:r>
+              <a:rPr lang="en-US" dirty="0" smtClean="0"/>
+              <a:t>Filtering</a:t>
+            </a:r>
+          </a:p>
+          <a:p>
+            <a:r>
+              <a:rPr lang="en-US" dirty="0" smtClean="0"/>
+              <a:t>By text, and by tag</a:t>
+            </a:r>
+            <a:endParaRPr lang="en-US" dirty="0" smtClean="0"/>
+          </a:p>
+        </p:txBody>
+      </p:sp>
+      <p:cxnSp>
+        <p:nvCxnSpPr>
+          <p:cNvPr id="5" name="Straight Arrow Connector 4"/>
+          <p:cNvCxnSpPr/>
+          <p:nvPr/>
+        </p:nvCxnSpPr>
+        <p:spPr>
+          <a:xfrm>
+            <a:off x="1295399" y="1999565"/>
+            <a:ext cx="0" cy="2115235"/>
+          </a:xfrm>
+          <a:prstGeom prst="straightConnector1">
+            <a:avLst/>
+          </a:prstGeom>
+          <a:ln w="38100">
+            <a:headEnd type="none" w="med" len="med"/>
+            <a:tailEnd type="arrow" w="med" len="med"/>
+          </a:ln>
+          <a:effectLst>
+            <a:outerShdw blurRad="101600" dist="101600" dir="2700000" algn="tl" rotWithShape="0">
+              <a:prstClr val="black">
+                <a:alpha val="40000"/>
+              </a:prstClr>
+            </a:outerShdw>
+          </a:effectLst>
+        </p:spPr>
+        <p:style>
+          <a:lnRef idx="2">
+            <a:schemeClr val="accent3"/>
+          </a:lnRef>
+          <a:fillRef idx="1">
+            <a:schemeClr val="lt1"/>
+          </a:fillRef>
+          <a:effectRef idx="0">
+            <a:schemeClr val="accent3"/>
+          </a:effectRef>
+          <a:fontRef idx="minor">
+            <a:schemeClr val="dk1"/>
+          </a:fontRef>
+        </p:style>
+      </p:cxnSp>
+      <p:cxnSp>
+        <p:nvCxnSpPr>
+          <p:cNvPr id="9" name="Straight Arrow Connector 8"/>
+          <p:cNvCxnSpPr/>
+          <p:nvPr/>
+        </p:nvCxnSpPr>
+        <p:spPr>
+          <a:xfrm>
+            <a:off x="2514600" y="1999565"/>
+            <a:ext cx="2590800" cy="1962835"/>
+          </a:xfrm>
+          <a:prstGeom prst="straightConnector1">
+            <a:avLst/>
+          </a:prstGeom>
+          <a:ln w="38100">
+            <a:headEnd type="none" w="med" len="med"/>
+            <a:tailEnd type="arrow" w="med" len="med"/>
+          </a:ln>
+          <a:effectLst>
+            <a:outerShdw blurRad="101600" dist="101600" dir="2700000" algn="tl" rotWithShape="0">
+              <a:prstClr val="black">
+                <a:alpha val="40000"/>
+              </a:prstClr>
+            </a:outerShdw>
+          </a:effectLst>
+        </p:spPr>
+        <p:style>
+          <a:lnRef idx="2">
+            <a:schemeClr val="accent3"/>
+          </a:lnRef>
+          <a:fillRef idx="1">
+            <a:schemeClr val="lt1"/>
+          </a:fillRef>
+          <a:effectRef idx="0">
+            <a:schemeClr val="accent3"/>
+          </a:effectRef>
+          <a:fontRef idx="minor">
+            <a:schemeClr val="dk1"/>
+          </a:fontRef>
+        </p:style>
+      </p:cxnSp>
+    </p:spTree>
+    <p:extLst>
+      <p:ext uri="{BB962C8B-B14F-4D97-AF65-F5344CB8AC3E}">
+        <p14:creationId xmlns:p14="http://schemas.microsoft.com/office/powerpoint/2010/main" val="2997788723"/>
+      </p:ext>
+    </p:extLst>
+  </p:cSld>
+  <p:clrMapOvr>
+    <a:masterClrMapping/>
+  </p:clrMapOvr>
+</p:sld>
+</file>
+
+<file path=ppt/slides/slide27.xml><?xml version="1.0" encoding="utf-8"?>
+<p:sld xmlns:a="http://schemas.openxmlformats.org/drawingml/2006/main" xmlns:r="http://schemas.openxmlformats.org/officeDocument/2006/relationships" xmlns:p="http://schemas.openxmlformats.org/presentationml/2006/main">
+  <p:cSld>
+    <p:spTree>
+      <p:nvGrpSpPr>
+        <p:cNvPr id="1" name=""/>
+        <p:cNvGrpSpPr/>
+        <p:nvPr/>
+      </p:nvGrpSpPr>
+      <p:grpSpPr>
+        <a:xfrm>
+          <a:off x="0" y="0"/>
+          <a:ext cx="0" cy="0"/>
+          <a:chOff x="0" y="0"/>
+          <a:chExt cx="0" cy="0"/>
+        </a:xfrm>
+      </p:grpSpPr>
+      <p:pic>
+        <p:nvPicPr>
+          <p:cNvPr id="14338" name="Picture 2"/>
+          <p:cNvPicPr>
+            <a:picLocks noChangeAspect="1" noChangeArrowheads="1"/>
+          </p:cNvPicPr>
+          <p:nvPr/>
+        </p:nvPicPr>
+        <p:blipFill>
+          <a:blip r:embed="rId2">
+            <a:extLst>
+              <a:ext uri="{28A0092B-C50C-407E-A947-70E740481C1C}">
+                <a14:useLocalDpi xmlns:a14="http://schemas.microsoft.com/office/drawing/2010/main" val="0"/>
+              </a:ext>
+            </a:extLst>
+          </a:blip>
+          <a:srcRect/>
+          <a:stretch>
+            <a:fillRect/>
+          </a:stretch>
+        </p:blipFill>
+        <p:spPr bwMode="auto">
+          <a:xfrm>
+            <a:off x="3810000" y="457199"/>
+            <a:ext cx="5010622" cy="6157545"/>
+          </a:xfrm>
+          <a:prstGeom prst="rect">
+            <a:avLst/>
+          </a:prstGeom>
+          <a:noFill/>
+          <a:ln>
+            <a:noFill/>
+          </a:ln>
+          <a:extLst>
+            <a:ext uri="{909E8E84-426E-40DD-AFC4-6F175D3DCCD1}">
+              <a14:hiddenFill xmlns:a14="http://schemas.microsoft.com/office/drawing/2010/main">
+                <a:solidFill>
+                  <a:schemeClr val="accent1"/>
+                </a:solidFill>
+              </a14:hiddenFill>
+            </a:ext>
+            <a:ext uri="{91240B29-F687-4F45-9708-019B960494DF}">
+              <a14:hiddenLine xmlns:a14="http://schemas.microsoft.com/office/drawing/2010/main" w="9525">
+                <a:solidFill>
+                  <a:schemeClr val="tx1"/>
+                </a:solidFill>
+                <a:miter lim="800000"/>
+                <a:headEnd/>
+                <a:tailEnd/>
+              </a14:hiddenLine>
+            </a:ext>
+          </a:extLst>
+        </p:spPr>
+      </p:pic>
+      <p:sp>
+        <p:nvSpPr>
+          <p:cNvPr id="4" name="TextBox 3"/>
+          <p:cNvSpPr txBox="1"/>
+          <p:nvPr/>
+        </p:nvSpPr>
+        <p:spPr>
+          <a:xfrm>
+            <a:off x="658090" y="1371600"/>
+            <a:ext cx="2369128" cy="923330"/>
+          </a:xfrm>
+          <a:prstGeom prst="rect">
+            <a:avLst/>
+          </a:prstGeom>
+          <a:effectLst>
+            <a:outerShdw blurRad="50800" dist="101600" dir="2700000" algn="tl" rotWithShape="0">
+              <a:prstClr val="black">
+                <a:alpha val="40000"/>
+              </a:prstClr>
+            </a:outerShdw>
+          </a:effectLst>
+        </p:spPr>
+        <p:style>
+          <a:lnRef idx="2">
+            <a:schemeClr val="accent3"/>
+          </a:lnRef>
+          <a:fillRef idx="1">
+            <a:schemeClr val="lt1"/>
+          </a:fillRef>
+          <a:effectRef idx="0">
+            <a:schemeClr val="accent3"/>
+          </a:effectRef>
+          <a:fontRef idx="minor">
+            <a:schemeClr val="dk1"/>
+          </a:fontRef>
+        </p:style>
+        <p:txBody>
+          <a:bodyPr wrap="square" rtlCol="0">
+            <a:spAutoFit/>
+          </a:bodyPr>
+          <a:lstStyle/>
+          <a:p>
+            <a:r>
+              <a:rPr lang="en-US" dirty="0" smtClean="0"/>
+              <a:t>Topics have:</a:t>
+            </a:r>
+          </a:p>
+          <a:p>
+            <a:endParaRPr lang="en-US" dirty="0" smtClean="0"/>
+          </a:p>
+          <a:p>
+            <a:r>
+              <a:rPr lang="en-US" dirty="0" smtClean="0"/>
+              <a:t>Notes Section</a:t>
+            </a:r>
+            <a:endParaRPr lang="en-US" dirty="0" smtClean="0"/>
+          </a:p>
+        </p:txBody>
+      </p:sp>
+      <p:sp>
+        <p:nvSpPr>
+          <p:cNvPr id="5" name="TextBox 4"/>
+          <p:cNvSpPr txBox="1"/>
+          <p:nvPr/>
+        </p:nvSpPr>
+        <p:spPr>
+          <a:xfrm>
+            <a:off x="637308" y="3581400"/>
+            <a:ext cx="2369128" cy="369332"/>
+          </a:xfrm>
+          <a:prstGeom prst="rect">
+            <a:avLst/>
+          </a:prstGeom>
+          <a:effectLst>
+            <a:outerShdw blurRad="50800" dist="101600" dir="2700000" algn="tl" rotWithShape="0">
+              <a:prstClr val="black">
+                <a:alpha val="40000"/>
+              </a:prstClr>
+            </a:outerShdw>
+          </a:effectLst>
+        </p:spPr>
+        <p:style>
+          <a:lnRef idx="2">
+            <a:schemeClr val="accent3"/>
+          </a:lnRef>
+          <a:fillRef idx="1">
+            <a:schemeClr val="lt1"/>
+          </a:fillRef>
+          <a:effectRef idx="0">
+            <a:schemeClr val="accent3"/>
+          </a:effectRef>
+          <a:fontRef idx="minor">
+            <a:schemeClr val="dk1"/>
+          </a:fontRef>
+        </p:style>
+        <p:txBody>
+          <a:bodyPr wrap="square" rtlCol="0">
+            <a:spAutoFit/>
+          </a:bodyPr>
+          <a:lstStyle/>
+          <a:p>
+            <a:r>
+              <a:rPr lang="en-US" dirty="0" smtClean="0"/>
+              <a:t>Attachment Docs</a:t>
+            </a:r>
+            <a:endParaRPr lang="en-US" dirty="0" smtClean="0"/>
+          </a:p>
+        </p:txBody>
+      </p:sp>
+      <p:sp>
+        <p:nvSpPr>
+          <p:cNvPr id="6" name="TextBox 5"/>
+          <p:cNvSpPr txBox="1"/>
+          <p:nvPr/>
+        </p:nvSpPr>
+        <p:spPr>
+          <a:xfrm>
+            <a:off x="616526" y="5015023"/>
+            <a:ext cx="2369128" cy="646331"/>
+          </a:xfrm>
+          <a:prstGeom prst="rect">
+            <a:avLst/>
+          </a:prstGeom>
+          <a:effectLst>
+            <a:outerShdw blurRad="50800" dist="101600" dir="2700000" algn="tl" rotWithShape="0">
+              <a:prstClr val="black">
+                <a:alpha val="40000"/>
+              </a:prstClr>
+            </a:outerShdw>
+          </a:effectLst>
+        </p:spPr>
+        <p:style>
+          <a:lnRef idx="2">
+            <a:schemeClr val="accent3"/>
+          </a:lnRef>
+          <a:fillRef idx="1">
+            <a:schemeClr val="lt1"/>
+          </a:fillRef>
+          <a:effectRef idx="0">
+            <a:schemeClr val="accent3"/>
+          </a:effectRef>
+          <a:fontRef idx="minor">
+            <a:schemeClr val="dk1"/>
+          </a:fontRef>
+        </p:style>
+        <p:txBody>
+          <a:bodyPr wrap="square" rtlCol="0">
+            <a:spAutoFit/>
+          </a:bodyPr>
+          <a:lstStyle/>
+          <a:p>
+            <a:r>
+              <a:rPr lang="en-US" dirty="0" smtClean="0"/>
+              <a:t>Comments and</a:t>
+            </a:r>
+          </a:p>
+          <a:p>
+            <a:r>
+              <a:rPr lang="en-US" dirty="0" smtClean="0"/>
+              <a:t>Proposals</a:t>
+            </a:r>
+            <a:endParaRPr lang="en-US" dirty="0" smtClean="0"/>
+          </a:p>
+        </p:txBody>
+      </p:sp>
+    </p:spTree>
+    <p:extLst>
+      <p:ext uri="{BB962C8B-B14F-4D97-AF65-F5344CB8AC3E}">
+        <p14:creationId xmlns:p14="http://schemas.microsoft.com/office/powerpoint/2010/main" val="3372860631"/>
+      </p:ext>
+    </p:extLst>
+  </p:cSld>
+  <p:clrMapOvr>
+    <a:masterClrMapping/>
+  </p:clrMapOvr>
+</p:sld>
+</file>
+
+<file path=ppt/slides/slide28.xml><?xml version="1.0" encoding="utf-8"?>
+<p:sld xmlns:a="http://schemas.openxmlformats.org/drawingml/2006/main" xmlns:r="http://schemas.openxmlformats.org/officeDocument/2006/relationships" xmlns:p="http://schemas.openxmlformats.org/presentationml/2006/main">
+  <p:cSld>
+    <p:spTree>
+      <p:nvGrpSpPr>
+        <p:cNvPr id="1" name=""/>
+        <p:cNvGrpSpPr/>
+        <p:nvPr/>
+      </p:nvGrpSpPr>
+      <p:grpSpPr>
+        <a:xfrm>
+          <a:off x="0" y="0"/>
+          <a:ext cx="0" cy="0"/>
+          <a:chOff x="0" y="0"/>
+          <a:chExt cx="0" cy="0"/>
+        </a:xfrm>
+      </p:grpSpPr>
+      <p:sp>
+        <p:nvSpPr>
+          <p:cNvPr id="2" name="Title 1"/>
+          <p:cNvSpPr>
+            <a:spLocks noGrp="1"/>
+          </p:cNvSpPr>
+          <p:nvPr>
+            <p:ph type="title"/>
+          </p:nvPr>
+        </p:nvSpPr>
+        <p:spPr/>
+        <p:txBody>
+          <a:bodyPr/>
+          <a:lstStyle/>
+          <a:p>
+            <a:r>
+              <a:rPr lang="en-US" dirty="0" smtClean="0"/>
+              <a:t>Request / response proposals</a:t>
+            </a:r>
+            <a:endParaRPr lang="en-US" dirty="0"/>
+          </a:p>
+        </p:txBody>
+      </p:sp>
+      <p:pic>
+        <p:nvPicPr>
+          <p:cNvPr id="13314" name="Picture 2"/>
+          <p:cNvPicPr>
+            <a:picLocks noChangeAspect="1" noChangeArrowheads="1"/>
+          </p:cNvPicPr>
+          <p:nvPr/>
+        </p:nvPicPr>
+        <p:blipFill>
+          <a:blip r:embed="rId2">
+            <a:extLst>
+              <a:ext uri="{28A0092B-C50C-407E-A947-70E740481C1C}">
+                <a14:useLocalDpi xmlns:a14="http://schemas.microsoft.com/office/drawing/2010/main" val="0"/>
+              </a:ext>
+            </a:extLst>
+          </a:blip>
+          <a:srcRect/>
+          <a:stretch>
+            <a:fillRect/>
+          </a:stretch>
+        </p:blipFill>
+        <p:spPr bwMode="auto">
+          <a:xfrm>
+            <a:off x="1520535" y="4495800"/>
+            <a:ext cx="5667375" cy="1952625"/>
+          </a:xfrm>
+          <a:prstGeom prst="rect">
+            <a:avLst/>
+          </a:prstGeom>
+          <a:ln>
+            <a:noFill/>
+          </a:ln>
+          <a:effectLst>
+            <a:outerShdw blurRad="292100" dist="139700" dir="2700000" algn="tl" rotWithShape="0">
+              <a:srgbClr val="333333">
+                <a:alpha val="65000"/>
+              </a:srgbClr>
+            </a:outerShdw>
+          </a:effectLst>
+          <a:extLst>
+            <a:ext uri="{909E8E84-426E-40DD-AFC4-6F175D3DCCD1}">
+              <a14:hiddenFill xmlns:a14="http://schemas.microsoft.com/office/drawing/2010/main">
+                <a:solidFill>
+                  <a:schemeClr val="accent1"/>
+                </a:solidFill>
+              </a14:hiddenFill>
+            </a:ext>
+            <a:ext uri="{91240B29-F687-4F45-9708-019B960494DF}">
+              <a14:hiddenLine xmlns:a14="http://schemas.microsoft.com/office/drawing/2010/main" w="9525">
+                <a:solidFill>
+                  <a:schemeClr val="tx1"/>
+                </a:solidFill>
+                <a:miter lim="800000"/>
+                <a:headEnd/>
+                <a:tailEnd/>
+              </a14:hiddenLine>
+            </a:ext>
+          </a:extLst>
+        </p:spPr>
+      </p:pic>
+      <p:sp>
+        <p:nvSpPr>
+          <p:cNvPr id="4" name="TextBox 3"/>
+          <p:cNvSpPr txBox="1"/>
+          <p:nvPr/>
+        </p:nvSpPr>
+        <p:spPr>
+          <a:xfrm>
+            <a:off x="602672" y="3902897"/>
+            <a:ext cx="3030202" cy="369332"/>
+          </a:xfrm>
+          <a:prstGeom prst="rect">
+            <a:avLst/>
+          </a:prstGeom>
+          <a:effectLst>
+            <a:outerShdw blurRad="50800" dist="101600" dir="2700000" algn="tl" rotWithShape="0">
+              <a:prstClr val="black">
+                <a:alpha val="40000"/>
+              </a:prstClr>
+            </a:outerShdw>
+          </a:effectLst>
+        </p:spPr>
+        <p:style>
+          <a:lnRef idx="2">
+            <a:schemeClr val="accent3"/>
+          </a:lnRef>
+          <a:fillRef idx="1">
+            <a:schemeClr val="lt1"/>
+          </a:fillRef>
+          <a:effectRef idx="0">
+            <a:schemeClr val="accent3"/>
+          </a:effectRef>
+          <a:fontRef idx="minor">
+            <a:schemeClr val="dk1"/>
+          </a:fontRef>
+        </p:style>
+        <p:txBody>
+          <a:bodyPr wrap="square" rtlCol="0">
+            <a:spAutoFit/>
+          </a:bodyPr>
+          <a:lstStyle/>
+          <a:p>
+            <a:r>
+              <a:rPr lang="en-US" dirty="0" smtClean="0"/>
+              <a:t>Others see:</a:t>
+            </a:r>
+            <a:endParaRPr lang="en-US" dirty="0" smtClean="0"/>
+          </a:p>
+        </p:txBody>
+      </p:sp>
+      <p:pic>
+        <p:nvPicPr>
+          <p:cNvPr id="13315" name="Picture 3"/>
+          <p:cNvPicPr>
+            <a:picLocks noChangeAspect="1" noChangeArrowheads="1"/>
+          </p:cNvPicPr>
+          <p:nvPr/>
+        </p:nvPicPr>
+        <p:blipFill>
+          <a:blip r:embed="rId3">
+            <a:extLst>
+              <a:ext uri="{28A0092B-C50C-407E-A947-70E740481C1C}">
+                <a14:useLocalDpi xmlns:a14="http://schemas.microsoft.com/office/drawing/2010/main" val="0"/>
+              </a:ext>
+            </a:extLst>
+          </a:blip>
+          <a:srcRect/>
+          <a:stretch>
+            <a:fillRect/>
+          </a:stretch>
+        </p:blipFill>
+        <p:spPr bwMode="auto">
+          <a:xfrm>
+            <a:off x="1604962" y="1676400"/>
+            <a:ext cx="5524500" cy="1895475"/>
+          </a:xfrm>
+          <a:prstGeom prst="rect">
+            <a:avLst/>
+          </a:prstGeom>
+          <a:noFill/>
+          <a:ln>
+            <a:noFill/>
+          </a:ln>
+          <a:extLst>
+            <a:ext uri="{909E8E84-426E-40DD-AFC4-6F175D3DCCD1}">
+              <a14:hiddenFill xmlns:a14="http://schemas.microsoft.com/office/drawing/2010/main">
+                <a:solidFill>
+                  <a:schemeClr val="accent1"/>
+                </a:solidFill>
+              </a14:hiddenFill>
+            </a:ext>
+            <a:ext uri="{91240B29-F687-4F45-9708-019B960494DF}">
+              <a14:hiddenLine xmlns:a14="http://schemas.microsoft.com/office/drawing/2010/main" w="9525">
+                <a:solidFill>
+                  <a:schemeClr val="tx1"/>
+                </a:solidFill>
+                <a:miter lim="800000"/>
+                <a:headEnd/>
+                <a:tailEnd/>
+              </a14:hiddenLine>
+            </a:ext>
+          </a:extLst>
+        </p:spPr>
+      </p:pic>
+      <p:sp>
+        <p:nvSpPr>
+          <p:cNvPr id="11" name="TextBox 10"/>
+          <p:cNvSpPr txBox="1"/>
+          <p:nvPr/>
+        </p:nvSpPr>
+        <p:spPr>
+          <a:xfrm>
+            <a:off x="602672" y="1159409"/>
+            <a:ext cx="3030201" cy="369332"/>
+          </a:xfrm>
+          <a:prstGeom prst="rect">
+            <a:avLst/>
+          </a:prstGeom>
+          <a:effectLst>
+            <a:outerShdw blurRad="50800" dist="101600" dir="2700000" algn="tl" rotWithShape="0">
+              <a:prstClr val="black">
+                <a:alpha val="40000"/>
+              </a:prstClr>
+            </a:outerShdw>
+          </a:effectLst>
+        </p:spPr>
+        <p:style>
+          <a:lnRef idx="2">
+            <a:schemeClr val="accent3"/>
+          </a:lnRef>
+          <a:fillRef idx="1">
+            <a:schemeClr val="lt1"/>
+          </a:fillRef>
+          <a:effectRef idx="0">
+            <a:schemeClr val="accent3"/>
+          </a:effectRef>
+          <a:fontRef idx="minor">
+            <a:schemeClr val="dk1"/>
+          </a:fontRef>
+        </p:style>
+        <p:txBody>
+          <a:bodyPr wrap="square" rtlCol="0">
+            <a:spAutoFit/>
+          </a:bodyPr>
+          <a:lstStyle/>
+          <a:p>
+            <a:r>
+              <a:rPr lang="en-US" dirty="0" smtClean="0"/>
+              <a:t>Proposer sees:</a:t>
+            </a:r>
+            <a:endParaRPr lang="en-US" dirty="0" smtClean="0"/>
+          </a:p>
+        </p:txBody>
+      </p:sp>
+      <p:sp>
+        <p:nvSpPr>
+          <p:cNvPr id="12" name="TextBox 11"/>
+          <p:cNvSpPr txBox="1"/>
+          <p:nvPr/>
+        </p:nvSpPr>
+        <p:spPr>
+          <a:xfrm>
+            <a:off x="5740110" y="1067076"/>
+            <a:ext cx="2895600" cy="923330"/>
+          </a:xfrm>
+          <a:prstGeom prst="rect">
+            <a:avLst/>
+          </a:prstGeom>
+          <a:effectLst>
+            <a:outerShdw blurRad="50800" dist="101600" dir="2700000" algn="tl" rotWithShape="0">
+              <a:prstClr val="black">
+                <a:alpha val="40000"/>
+              </a:prstClr>
+            </a:outerShdw>
+          </a:effectLst>
+        </p:spPr>
+        <p:style>
+          <a:lnRef idx="2">
+            <a:schemeClr val="accent3"/>
+          </a:lnRef>
+          <a:fillRef idx="1">
+            <a:schemeClr val="lt1"/>
+          </a:fillRef>
+          <a:effectRef idx="0">
+            <a:schemeClr val="accent3"/>
+          </a:effectRef>
+          <a:fontRef idx="minor">
+            <a:schemeClr val="dk1"/>
+          </a:fontRef>
+        </p:style>
+        <p:txBody>
+          <a:bodyPr wrap="square" rtlCol="0">
+            <a:spAutoFit/>
+          </a:bodyPr>
+          <a:lstStyle/>
+          <a:p>
+            <a:r>
+              <a:rPr lang="en-US" dirty="0" smtClean="0"/>
+              <a:t>Based on the principle of gaining consensus, and not voting.</a:t>
+            </a:r>
+            <a:endParaRPr lang="en-US" dirty="0" smtClean="0"/>
+          </a:p>
+        </p:txBody>
+      </p:sp>
+    </p:spTree>
+    <p:extLst>
+      <p:ext uri="{BB962C8B-B14F-4D97-AF65-F5344CB8AC3E}">
+        <p14:creationId xmlns:p14="http://schemas.microsoft.com/office/powerpoint/2010/main" val="1757707049"/>
+      </p:ext>
+    </p:extLst>
+  </p:cSld>
+  <p:clrMapOvr>
+    <a:masterClrMapping/>
+  </p:clrMapOvr>
+</p:sld>
+</file>
+
+<file path=ppt/slides/slide29.xml><?xml version="1.0" encoding="utf-8"?>
+<p:sld xmlns:a="http://schemas.openxmlformats.org/drawingml/2006/main" xmlns:r="http://schemas.openxmlformats.org/officeDocument/2006/relationships" xmlns:p="http://schemas.openxmlformats.org/presentationml/2006/main">
+  <p:cSld>
+    <p:spTree>
+      <p:nvGrpSpPr>
+        <p:cNvPr id="1" name=""/>
+        <p:cNvGrpSpPr/>
+        <p:nvPr/>
+      </p:nvGrpSpPr>
+      <p:grpSpPr>
+        <a:xfrm>
+          <a:off x="0" y="0"/>
+          <a:ext cx="0" cy="0"/>
+          <a:chOff x="0" y="0"/>
+          <a:chExt cx="0" cy="0"/>
+        </a:xfrm>
+      </p:grpSpPr>
+      <p:sp>
+        <p:nvSpPr>
+          <p:cNvPr id="2" name="Title 1"/>
+          <p:cNvSpPr>
+            <a:spLocks noGrp="1"/>
+          </p:cNvSpPr>
+          <p:nvPr>
+            <p:ph type="title"/>
+          </p:nvPr>
+        </p:nvSpPr>
+        <p:spPr/>
+        <p:txBody>
+          <a:bodyPr/>
+          <a:lstStyle/>
+          <a:p>
+            <a:r>
+              <a:rPr lang="en-US" dirty="0" smtClean="0"/>
+              <a:t>Search for any note, anywhere</a:t>
+            </a:r>
+            <a:endParaRPr lang="en-US" dirty="0"/>
+          </a:p>
+        </p:txBody>
+      </p:sp>
+      <p:pic>
+        <p:nvPicPr>
+          <p:cNvPr id="10242" name="Picture 2"/>
+          <p:cNvPicPr>
+            <a:picLocks noChangeAspect="1" noChangeArrowheads="1"/>
+          </p:cNvPicPr>
+          <p:nvPr/>
+        </p:nvPicPr>
+        <p:blipFill>
+          <a:blip r:embed="rId2">
+            <a:extLst>
+              <a:ext uri="{28A0092B-C50C-407E-A947-70E740481C1C}">
+                <a14:useLocalDpi xmlns:a14="http://schemas.microsoft.com/office/drawing/2010/main" val="0"/>
+              </a:ext>
+            </a:extLst>
+          </a:blip>
+          <a:srcRect/>
+          <a:stretch>
+            <a:fillRect/>
+          </a:stretch>
+        </p:blipFill>
+        <p:spPr bwMode="auto">
+          <a:xfrm>
+            <a:off x="304800" y="1475448"/>
+            <a:ext cx="8610600" cy="5126188"/>
+          </a:xfrm>
+          <a:prstGeom prst="rect">
+            <a:avLst/>
+          </a:prstGeom>
+          <a:noFill/>
+          <a:ln>
+            <a:noFill/>
+          </a:ln>
+          <a:extLst>
+            <a:ext uri="{909E8E84-426E-40DD-AFC4-6F175D3DCCD1}">
+              <a14:hiddenFill xmlns:a14="http://schemas.microsoft.com/office/drawing/2010/main">
+                <a:solidFill>
+                  <a:schemeClr val="accent1"/>
+                </a:solidFill>
+              </a14:hiddenFill>
+            </a:ext>
+            <a:ext uri="{91240B29-F687-4F45-9708-019B960494DF}">
+              <a14:hiddenLine xmlns:a14="http://schemas.microsoft.com/office/drawing/2010/main" w="9525">
+                <a:solidFill>
+                  <a:schemeClr val="tx1"/>
+                </a:solidFill>
+                <a:miter lim="800000"/>
+                <a:headEnd/>
+                <a:tailEnd/>
+              </a14:hiddenLine>
+            </a:ext>
+          </a:extLst>
+        </p:spPr>
+      </p:pic>
+    </p:spTree>
+    <p:extLst>
+      <p:ext uri="{BB962C8B-B14F-4D97-AF65-F5344CB8AC3E}">
+        <p14:creationId xmlns:p14="http://schemas.microsoft.com/office/powerpoint/2010/main" val="4234956835"/>
       </p:ext>
     </p:extLst>
   </p:cSld>
@@ -2710,6 +4694,327 @@
       </p:par>
     </p:tnLst>
   </p:timing>
+</p:sld>
+</file>
+
+<file path=ppt/slides/slide30.xml><?xml version="1.0" encoding="utf-8"?>
+<p:sld xmlns:a="http://schemas.openxmlformats.org/drawingml/2006/main" xmlns:r="http://schemas.openxmlformats.org/officeDocument/2006/relationships" xmlns:p="http://schemas.openxmlformats.org/presentationml/2006/main">
+  <p:cSld>
+    <p:spTree>
+      <p:nvGrpSpPr>
+        <p:cNvPr id="1" name=""/>
+        <p:cNvGrpSpPr/>
+        <p:nvPr/>
+      </p:nvGrpSpPr>
+      <p:grpSpPr>
+        <a:xfrm>
+          <a:off x="0" y="0"/>
+          <a:ext cx="0" cy="0"/>
+          <a:chOff x="0" y="0"/>
+          <a:chExt cx="0" cy="0"/>
+        </a:xfrm>
+      </p:grpSpPr>
+      <p:sp>
+        <p:nvSpPr>
+          <p:cNvPr id="2" name="Title 1"/>
+          <p:cNvSpPr>
+            <a:spLocks noGrp="1"/>
+          </p:cNvSpPr>
+          <p:nvPr>
+            <p:ph type="title"/>
+          </p:nvPr>
+        </p:nvSpPr>
+        <p:spPr/>
+        <p:txBody>
+          <a:bodyPr/>
+          <a:lstStyle/>
+          <a:p>
+            <a:r>
+              <a:rPr lang="en-US" dirty="0" smtClean="0"/>
+              <a:t>Manage Permissions</a:t>
+            </a:r>
+            <a:endParaRPr lang="en-US" dirty="0"/>
+          </a:p>
+        </p:txBody>
+      </p:sp>
+      <p:pic>
+        <p:nvPicPr>
+          <p:cNvPr id="11266" name="Picture 2"/>
+          <p:cNvPicPr>
+            <a:picLocks noChangeAspect="1" noChangeArrowheads="1"/>
+          </p:cNvPicPr>
+          <p:nvPr/>
+        </p:nvPicPr>
+        <p:blipFill>
+          <a:blip r:embed="rId2">
+            <a:extLst>
+              <a:ext uri="{28A0092B-C50C-407E-A947-70E740481C1C}">
+                <a14:useLocalDpi xmlns:a14="http://schemas.microsoft.com/office/drawing/2010/main" val="0"/>
+              </a:ext>
+            </a:extLst>
+          </a:blip>
+          <a:srcRect/>
+          <a:stretch>
+            <a:fillRect/>
+          </a:stretch>
+        </p:blipFill>
+        <p:spPr bwMode="auto">
+          <a:xfrm>
+            <a:off x="761999" y="1143000"/>
+            <a:ext cx="7527823" cy="5715000"/>
+          </a:xfrm>
+          <a:prstGeom prst="rect">
+            <a:avLst/>
+          </a:prstGeom>
+          <a:noFill/>
+          <a:ln>
+            <a:noFill/>
+          </a:ln>
+          <a:extLst>
+            <a:ext uri="{909E8E84-426E-40DD-AFC4-6F175D3DCCD1}">
+              <a14:hiddenFill xmlns:a14="http://schemas.microsoft.com/office/drawing/2010/main">
+                <a:solidFill>
+                  <a:schemeClr val="accent1"/>
+                </a:solidFill>
+              </a14:hiddenFill>
+            </a:ext>
+            <a:ext uri="{91240B29-F687-4F45-9708-019B960494DF}">
+              <a14:hiddenLine xmlns:a14="http://schemas.microsoft.com/office/drawing/2010/main" w="9525">
+                <a:solidFill>
+                  <a:schemeClr val="tx1"/>
+                </a:solidFill>
+                <a:miter lim="800000"/>
+                <a:headEnd/>
+                <a:tailEnd/>
+              </a14:hiddenLine>
+            </a:ext>
+          </a:extLst>
+        </p:spPr>
+      </p:pic>
+    </p:spTree>
+    <p:extLst>
+      <p:ext uri="{BB962C8B-B14F-4D97-AF65-F5344CB8AC3E}">
+        <p14:creationId xmlns:p14="http://schemas.microsoft.com/office/powerpoint/2010/main" val="2389180230"/>
+      </p:ext>
+    </p:extLst>
+  </p:cSld>
+  <p:clrMapOvr>
+    <a:masterClrMapping/>
+  </p:clrMapOvr>
+</p:sld>
+</file>
+
+<file path=ppt/slides/slide31.xml><?xml version="1.0" encoding="utf-8"?>
+<p:sld xmlns:a="http://schemas.openxmlformats.org/drawingml/2006/main" xmlns:r="http://schemas.openxmlformats.org/officeDocument/2006/relationships" xmlns:p="http://schemas.openxmlformats.org/presentationml/2006/main">
+  <p:cSld>
+    <p:spTree>
+      <p:nvGrpSpPr>
+        <p:cNvPr id="1" name=""/>
+        <p:cNvGrpSpPr/>
+        <p:nvPr/>
+      </p:nvGrpSpPr>
+      <p:grpSpPr>
+        <a:xfrm>
+          <a:off x="0" y="0"/>
+          <a:ext cx="0" cy="0"/>
+          <a:chOff x="0" y="0"/>
+          <a:chExt cx="0" cy="0"/>
+        </a:xfrm>
+      </p:grpSpPr>
+      <p:sp>
+        <p:nvSpPr>
+          <p:cNvPr id="2" name="Title 1"/>
+          <p:cNvSpPr>
+            <a:spLocks noGrp="1"/>
+          </p:cNvSpPr>
+          <p:nvPr>
+            <p:ph type="title"/>
+          </p:nvPr>
+        </p:nvSpPr>
+        <p:spPr/>
+        <p:txBody>
+          <a:bodyPr/>
+          <a:lstStyle/>
+          <a:p>
+            <a:r>
+              <a:rPr lang="en-US" dirty="0" smtClean="0"/>
+              <a:t>Personal Settings</a:t>
+            </a:r>
+            <a:endParaRPr lang="en-US" dirty="0"/>
+          </a:p>
+        </p:txBody>
+      </p:sp>
+      <p:pic>
+        <p:nvPicPr>
+          <p:cNvPr id="12290" name="Picture 2"/>
+          <p:cNvPicPr>
+            <a:picLocks noChangeAspect="1" noChangeArrowheads="1"/>
+          </p:cNvPicPr>
+          <p:nvPr/>
+        </p:nvPicPr>
+        <p:blipFill>
+          <a:blip r:embed="rId2">
+            <a:extLst>
+              <a:ext uri="{28A0092B-C50C-407E-A947-70E740481C1C}">
+                <a14:useLocalDpi xmlns:a14="http://schemas.microsoft.com/office/drawing/2010/main" val="0"/>
+              </a:ext>
+            </a:extLst>
+          </a:blip>
+          <a:srcRect/>
+          <a:stretch>
+            <a:fillRect/>
+          </a:stretch>
+        </p:blipFill>
+        <p:spPr bwMode="auto">
+          <a:xfrm>
+            <a:off x="685800" y="1455810"/>
+            <a:ext cx="7410450" cy="5168827"/>
+          </a:xfrm>
+          <a:prstGeom prst="rect">
+            <a:avLst/>
+          </a:prstGeom>
+          <a:noFill/>
+          <a:ln>
+            <a:noFill/>
+          </a:ln>
+          <a:extLst>
+            <a:ext uri="{909E8E84-426E-40DD-AFC4-6F175D3DCCD1}">
+              <a14:hiddenFill xmlns:a14="http://schemas.microsoft.com/office/drawing/2010/main">
+                <a:solidFill>
+                  <a:schemeClr val="accent1"/>
+                </a:solidFill>
+              </a14:hiddenFill>
+            </a:ext>
+            <a:ext uri="{91240B29-F687-4F45-9708-019B960494DF}">
+              <a14:hiddenLine xmlns:a14="http://schemas.microsoft.com/office/drawing/2010/main" w="9525">
+                <a:solidFill>
+                  <a:schemeClr val="tx1"/>
+                </a:solidFill>
+                <a:miter lim="800000"/>
+                <a:headEnd/>
+                <a:tailEnd/>
+              </a14:hiddenLine>
+            </a:ext>
+          </a:extLst>
+        </p:spPr>
+      </p:pic>
+    </p:spTree>
+    <p:extLst>
+      <p:ext uri="{BB962C8B-B14F-4D97-AF65-F5344CB8AC3E}">
+        <p14:creationId xmlns:p14="http://schemas.microsoft.com/office/powerpoint/2010/main" val="490024035"/>
+      </p:ext>
+    </p:extLst>
+  </p:cSld>
+  <p:clrMapOvr>
+    <a:masterClrMapping/>
+  </p:clrMapOvr>
+</p:sld>
+</file>
+
+<file path=ppt/slides/slide32.xml><?xml version="1.0" encoding="utf-8"?>
+<p:sld xmlns:a="http://schemas.openxmlformats.org/drawingml/2006/main" xmlns:r="http://schemas.openxmlformats.org/officeDocument/2006/relationships" xmlns:p="http://schemas.openxmlformats.org/presentationml/2006/main">
+  <p:cSld>
+    <p:spTree>
+      <p:nvGrpSpPr>
+        <p:cNvPr id="1" name=""/>
+        <p:cNvGrpSpPr/>
+        <p:nvPr/>
+      </p:nvGrpSpPr>
+      <p:grpSpPr>
+        <a:xfrm>
+          <a:off x="0" y="0"/>
+          <a:ext cx="0" cy="0"/>
+          <a:chOff x="0" y="0"/>
+          <a:chExt cx="0" cy="0"/>
+        </a:xfrm>
+      </p:grpSpPr>
+      <p:sp>
+        <p:nvSpPr>
+          <p:cNvPr id="2" name="Title 1"/>
+          <p:cNvSpPr>
+            <a:spLocks noGrp="1"/>
+          </p:cNvSpPr>
+          <p:nvPr>
+            <p:ph type="title"/>
+          </p:nvPr>
+        </p:nvSpPr>
+        <p:spPr/>
+        <p:txBody>
+          <a:bodyPr/>
+          <a:lstStyle/>
+          <a:p>
+            <a:r>
+              <a:rPr lang="en-US" dirty="0" smtClean="0"/>
+              <a:t>Manage Colored Tags</a:t>
+            </a:r>
+            <a:endParaRPr lang="en-US" dirty="0"/>
+          </a:p>
+        </p:txBody>
+      </p:sp>
+      <p:pic>
+        <p:nvPicPr>
+          <p:cNvPr id="15363" name="Picture 3"/>
+          <p:cNvPicPr>
+            <a:picLocks noChangeAspect="1" noChangeArrowheads="1"/>
+          </p:cNvPicPr>
+          <p:nvPr/>
+        </p:nvPicPr>
+        <p:blipFill>
+          <a:blip r:embed="rId2">
+            <a:extLst>
+              <a:ext uri="{28A0092B-C50C-407E-A947-70E740481C1C}">
+                <a14:useLocalDpi xmlns:a14="http://schemas.microsoft.com/office/drawing/2010/main" val="0"/>
+              </a:ext>
+            </a:extLst>
+          </a:blip>
+          <a:srcRect/>
+          <a:stretch>
+            <a:fillRect/>
+          </a:stretch>
+        </p:blipFill>
+        <p:spPr bwMode="auto">
+          <a:xfrm>
+            <a:off x="533400" y="1100743"/>
+            <a:ext cx="8077200" cy="5538182"/>
+          </a:xfrm>
+          <a:prstGeom prst="rect">
+            <a:avLst/>
+          </a:prstGeom>
+          <a:noFill/>
+          <a:ln>
+            <a:noFill/>
+          </a:ln>
+          <a:extLst>
+            <a:ext uri="{909E8E84-426E-40DD-AFC4-6F175D3DCCD1}">
+              <a14:hiddenFill xmlns:a14="http://schemas.microsoft.com/office/drawing/2010/main">
+                <a:solidFill>
+                  <a:schemeClr val="accent1"/>
+                </a:solidFill>
+              </a14:hiddenFill>
+            </a:ext>
+            <a:ext uri="{91240B29-F687-4F45-9708-019B960494DF}">
+              <a14:hiddenLine xmlns:a14="http://schemas.microsoft.com/office/drawing/2010/main" w="9525">
+                <a:solidFill>
+                  <a:schemeClr val="tx1"/>
+                </a:solidFill>
+                <a:miter lim="800000"/>
+                <a:headEnd/>
+                <a:tailEnd/>
+              </a14:hiddenLine>
+            </a:ext>
+          </a:extLst>
+        </p:spPr>
+      </p:pic>
+    </p:spTree>
+    <p:extLst>
+      <p:ext uri="{BB962C8B-B14F-4D97-AF65-F5344CB8AC3E}">
+        <p14:creationId xmlns:p14="http://schemas.microsoft.com/office/powerpoint/2010/main" val="3910540268"/>
+      </p:ext>
+    </p:extLst>
+  </p:cSld>
+  <p:clrMapOvr>
+    <a:masterClrMapping/>
+  </p:clrMapOvr>
 </p:sld>
 </file>
 

</xml_diff>